<commit_message>
Update Design Patterns presentation
</commit_message>
<xml_diff>
--- a/Programming with C#/4. C# High-Quality Code/15. Design Patterns/Design Patterns.pptx
+++ b/Programming with C#/4. C# High-Quality Code/15. Design Patterns/Design Patterns.pptx
@@ -482,7 +482,7 @@
             <a:fld id="{3BF7C7B5-275F-4D1F-9AB4-9255447DBC73}" type="datetimeFigureOut">
               <a:rPr lang="en-US"/>
               <a:pPr/>
-              <a:t>6/27/2014</a:t>
+              <a:t>7/3/2014</a:t>
             </a:fld>
             <a:endParaRPr lang="en-US" dirty="0"/>
           </a:p>
@@ -713,7 +713,7 @@
             <a:fld id="{9B46F231-FB2B-4655-A644-E2477325E686}" type="datetimeFigureOut">
               <a:rPr lang="en-US"/>
               <a:pPr/>
-              <a:t>6/27/2014</a:t>
+              <a:t>7/3/2014</a:t>
             </a:fld>
             <a:endParaRPr lang="en-US" dirty="0"/>
           </a:p>
@@ -29740,7 +29740,7 @@
         </p:nvSpPr>
         <p:spPr>
           <a:xfrm>
-            <a:off x="228600" y="685800"/>
+            <a:off x="228600" y="609600"/>
             <a:ext cx="8686800" cy="5791200"/>
           </a:xfrm>
         </p:spPr>
@@ -29752,6 +29752,12 @@
               <a:lnSpc>
                 <a:spcPct val="100000"/>
               </a:lnSpc>
+              <a:spcBef>
+                <a:spcPts val="0"/>
+              </a:spcBef>
+              <a:spcAft>
+                <a:spcPts val="0"/>
+              </a:spcAft>
             </a:pPr>
             <a:r>
               <a:rPr lang="en-US" dirty="0" smtClean="0"/>
@@ -29763,6 +29769,12 @@
               <a:lnSpc>
                 <a:spcPct val="100000"/>
               </a:lnSpc>
+              <a:spcBef>
+                <a:spcPts val="0"/>
+              </a:spcBef>
+              <a:spcAft>
+                <a:spcPts val="0"/>
+              </a:spcAft>
             </a:pPr>
             <a:r>
               <a:rPr lang="en-US" dirty="0" smtClean="0">
@@ -29800,11 +29812,54 @@
               <a:lnSpc>
                 <a:spcPct val="100000"/>
               </a:lnSpc>
+              <a:spcBef>
+                <a:spcPts val="0"/>
+              </a:spcBef>
+              <a:spcAft>
+                <a:spcPts val="0"/>
+              </a:spcAft>
             </a:pPr>
             <a:r>
               <a:rPr lang="en-US" dirty="0" smtClean="0"/>
-              <a:t>Doesn’t let the subclasses to change the algorithm structure</a:t>
-            </a:r>
+              <a:t>Doesn’t let the subclasses to </a:t>
+            </a:r>
+            <a:r>
+              <a:rPr lang="en-US" dirty="0" smtClean="0"/>
+              <a:t>change</a:t>
+            </a:r>
+            <a:br>
+              <a:rPr lang="en-US" dirty="0" smtClean="0"/>
+            </a:br>
+            <a:r>
+              <a:rPr lang="en-US" dirty="0" smtClean="0"/>
+              <a:t>the </a:t>
+            </a:r>
+            <a:r>
+              <a:rPr lang="en-US" dirty="0" smtClean="0"/>
+              <a:t>algorithm </a:t>
+            </a:r>
+            <a:r>
+              <a:rPr lang="en-US" dirty="0" smtClean="0"/>
+              <a:t>structure</a:t>
+            </a:r>
+          </a:p>
+          <a:p>
+            <a:pPr>
+              <a:lnSpc>
+                <a:spcPct val="100000"/>
+              </a:lnSpc>
+              <a:spcBef>
+                <a:spcPts val="0"/>
+              </a:spcBef>
+              <a:spcAft>
+                <a:spcPts val="0"/>
+              </a:spcAft>
+            </a:pPr>
+            <a:r>
+              <a:rPr lang="en-US" dirty="0" smtClean="0"/>
+              <a:t>Relies on inheritance; Strategy on composition</a:t>
+            </a:r>
+            <a:endParaRPr lang="en-US" dirty="0" smtClean="0"/>
           </a:p>
         </p:txBody>
       </p:sp>
@@ -29853,7 +29908,7 @@
         </p:blipFill>
         <p:spPr>
           <a:xfrm>
-            <a:off x="4343400" y="4038600"/>
+            <a:off x="4063168" y="4579189"/>
             <a:ext cx="4551745" cy="1981200"/>
           </a:xfrm>
           <a:prstGeom prst="roundRect">
@@ -29897,7 +29952,7 @@
         </p:blipFill>
         <p:spPr bwMode="auto">
           <a:xfrm>
-            <a:off x="1219200" y="4518660"/>
+            <a:off x="1143000" y="4598239"/>
             <a:ext cx="2544246" cy="1943100"/>
           </a:xfrm>
           <a:prstGeom prst="rect">
@@ -29913,6 +29968,47 @@
               </a:srgbClr>
             </a:outerShdw>
           </a:effectLst>
+          <a:extLst>
+            <a:ext uri="{909E8E84-426E-40DD-AFC4-6F175D3DCCD1}">
+              <a14:hiddenFill xmlns:a14="http://schemas.microsoft.com/office/drawing/2010/main">
+                <a:solidFill>
+                  <a:srgbClr val="FFFFFF"/>
+                </a:solidFill>
+              </a14:hiddenFill>
+            </a:ext>
+          </a:extLst>
+        </p:spPr>
+      </p:pic>
+      <p:pic>
+        <p:nvPicPr>
+          <p:cNvPr id="4" name="Picture 2" descr="http://big.info/wp-content/uploads/2012/01/4zeimmsdyc58esq34wbi.png"/>
+          <p:cNvPicPr>
+            <a:picLocks noChangeAspect="1" noChangeArrowheads="1"/>
+          </p:cNvPicPr>
+          <p:nvPr/>
+        </p:nvPicPr>
+        <p:blipFill>
+          <a:blip r:embed="rId5" cstate="print">
+            <a:extLst>
+              <a:ext uri="{28A0092B-C50C-407E-A947-70E740481C1C}">
+                <a14:useLocalDpi xmlns:a14="http://schemas.microsoft.com/office/drawing/2010/main" val="0"/>
+              </a:ext>
+            </a:extLst>
+          </a:blip>
+          <a:srcRect/>
+          <a:stretch>
+            <a:fillRect/>
+          </a:stretch>
+        </p:blipFill>
+        <p:spPr bwMode="auto">
+          <a:xfrm>
+            <a:off x="7315200" y="2819400"/>
+            <a:ext cx="1066800" cy="1066800"/>
+          </a:xfrm>
+          <a:prstGeom prst="rect">
+            <a:avLst/>
+          </a:prstGeom>
+          <a:noFill/>
           <a:extLst>
             <a:ext uri="{909E8E84-426E-40DD-AFC4-6F175D3DCCD1}">
               <a14:hiddenFill xmlns:a14="http://schemas.microsoft.com/office/drawing/2010/main">
@@ -31713,7 +31809,47 @@
                 <a:latin typeface="Consolas" pitchFamily="49" charset="0"/>
                 <a:cs typeface="Consolas" pitchFamily="49" charset="0"/>
               </a:rPr>
-              <a:t>abstract void Sort(List&lt;object&gt; list);</a:t>
+              <a:t>abstract void </a:t>
+            </a:r>
+            <a:r>
+              <a:rPr lang="en-US" sz="2000" dirty="0" smtClean="0">
+                <a:solidFill>
+                  <a:srgbClr val="8CF4F2"/>
+                </a:solidFill>
+                <a:latin typeface="Consolas" pitchFamily="49" charset="0"/>
+                <a:cs typeface="Consolas" pitchFamily="49" charset="0"/>
+              </a:rPr>
+              <a:t>Sort(</a:t>
+            </a:r>
+            <a:r>
+              <a:rPr lang="en-US" sz="2000" dirty="0" err="1" smtClean="0">
+                <a:solidFill>
+                  <a:srgbClr val="8CF4F2"/>
+                </a:solidFill>
+                <a:latin typeface="Consolas" pitchFamily="49" charset="0"/>
+                <a:cs typeface="Consolas" pitchFamily="49" charset="0"/>
+              </a:rPr>
+              <a:t>IList</a:t>
+            </a:r>
+            <a:r>
+              <a:rPr lang="en-US" sz="2000" dirty="0" smtClean="0">
+                <a:solidFill>
+                  <a:srgbClr val="8CF4F2"/>
+                </a:solidFill>
+                <a:latin typeface="Consolas" pitchFamily="49" charset="0"/>
+                <a:cs typeface="Consolas" pitchFamily="49" charset="0"/>
+              </a:rPr>
+              <a:t>&lt;object</a:t>
+            </a:r>
+            <a:r>
+              <a:rPr lang="en-US" sz="2000" dirty="0">
+                <a:solidFill>
+                  <a:srgbClr val="8CF4F2"/>
+                </a:solidFill>
+                <a:latin typeface="Consolas" pitchFamily="49" charset="0"/>
+                <a:cs typeface="Consolas" pitchFamily="49" charset="0"/>
+              </a:rPr>
+              <a:t>&gt; list);</a:t>
             </a:r>
           </a:p>
           <a:p>
@@ -32138,37 +32274,67 @@
                 <a:latin typeface="Consolas" pitchFamily="49" charset="0"/>
                 <a:cs typeface="Consolas" pitchFamily="49" charset="0"/>
               </a:rPr>
-              <a:t>   public override void Sort(</a:t>
-            </a:r>
-            <a:r>
-              <a:rPr lang="en-US" sz="2000" dirty="0" err="1">
+              <a:t>   public override void </a:t>
+            </a:r>
+            <a:r>
+              <a:rPr lang="en-US" sz="2000" dirty="0">
                 <a:solidFill>
                   <a:srgbClr val="8CF4F2"/>
                 </a:solidFill>
                 <a:latin typeface="Consolas" pitchFamily="49" charset="0"/>
                 <a:cs typeface="Consolas" pitchFamily="49" charset="0"/>
               </a:rPr>
-              <a:t>ArrayList</a:t>
-            </a:r>
-            <a:r>
-              <a:rPr lang="en-US" sz="2000" dirty="0">
+              <a:t>Sort(</a:t>
+            </a:r>
+            <a:r>
+              <a:rPr lang="en-US" sz="2000" dirty="0" err="1">
                 <a:solidFill>
                   <a:srgbClr val="8CF4F2"/>
                 </a:solidFill>
                 <a:latin typeface="Consolas" pitchFamily="49" charset="0"/>
                 <a:cs typeface="Consolas" pitchFamily="49" charset="0"/>
               </a:rPr>
-              <a:t> list) </a:t>
-            </a:r>
-            <a:r>
-              <a:rPr lang="en-US" sz="2000" dirty="0" smtClean="0">
+              <a:t>IList</a:t>
+            </a:r>
+            <a:r>
+              <a:rPr lang="en-US" sz="2000" dirty="0">
                 <a:solidFill>
                   <a:srgbClr val="8CF4F2"/>
                 </a:solidFill>
                 <a:latin typeface="Consolas" pitchFamily="49" charset="0"/>
                 <a:cs typeface="Consolas" pitchFamily="49" charset="0"/>
               </a:rPr>
-              <a:t>{ /* ... */ }</a:t>
+              <a:t>&lt;object&gt; </a:t>
+            </a:r>
+            <a:r>
+              <a:rPr lang="en-US" sz="2000" dirty="0">
+                <a:solidFill>
+                  <a:srgbClr val="8CF4F2"/>
+                </a:solidFill>
+                <a:latin typeface="Consolas" pitchFamily="49" charset="0"/>
+                <a:cs typeface="Consolas" pitchFamily="49" charset="0"/>
+              </a:rPr>
+              <a:t>list) </a:t>
+            </a:r>
+            <a:r>
+              <a:rPr lang="en-US" sz="2000" dirty="0" smtClean="0">
+                <a:solidFill>
+                  <a:srgbClr val="8CF4F2"/>
+                </a:solidFill>
+                <a:latin typeface="Consolas" pitchFamily="49" charset="0"/>
+                <a:cs typeface="Consolas" pitchFamily="49" charset="0"/>
+              </a:rPr>
+              <a:t>{ </a:t>
+            </a:r>
+            <a:r>
+              <a:rPr lang="en-US" sz="2000" dirty="0" smtClean="0">
+                <a:solidFill>
+                  <a:srgbClr val="8CF4F2"/>
+                </a:solidFill>
+                <a:latin typeface="Consolas" pitchFamily="49" charset="0"/>
+                <a:cs typeface="Consolas" pitchFamily="49" charset="0"/>
+              </a:rPr>
+              <a:t>... }</a:t>
             </a:r>
             <a:endParaRPr lang="en-US" sz="2000" dirty="0">
               <a:solidFill>
@@ -32585,7 +32751,37 @@
                 <a:latin typeface="Consolas" pitchFamily="49" charset="0"/>
                 <a:cs typeface="Consolas" pitchFamily="49" charset="0"/>
               </a:rPr>
-              <a:t>private List&lt;object&gt; list = new List&lt;object&gt;();</a:t>
+              <a:t>private </a:t>
+            </a:r>
+            <a:r>
+              <a:rPr lang="en-US" sz="2000" dirty="0" err="1" smtClean="0">
+                <a:solidFill>
+                  <a:srgbClr val="8CF4F2"/>
+                </a:solidFill>
+                <a:latin typeface="Consolas" pitchFamily="49" charset="0"/>
+                <a:cs typeface="Consolas" pitchFamily="49" charset="0"/>
+              </a:rPr>
+              <a:t>IList</a:t>
+            </a:r>
+            <a:r>
+              <a:rPr lang="en-US" sz="2000" dirty="0" smtClean="0">
+                <a:solidFill>
+                  <a:srgbClr val="8CF4F2"/>
+                </a:solidFill>
+                <a:latin typeface="Consolas" pitchFamily="49" charset="0"/>
+                <a:cs typeface="Consolas" pitchFamily="49" charset="0"/>
+              </a:rPr>
+              <a:t>&lt;object</a:t>
+            </a:r>
+            <a:r>
+              <a:rPr lang="en-US" sz="2000" dirty="0">
+                <a:solidFill>
+                  <a:srgbClr val="8CF4F2"/>
+                </a:solidFill>
+                <a:latin typeface="Consolas" pitchFamily="49" charset="0"/>
+                <a:cs typeface="Consolas" pitchFamily="49" charset="0"/>
+              </a:rPr>
+              <a:t>&gt; list = new List&lt;object&gt;();</a:t>
             </a:r>
           </a:p>
           <a:p>
@@ -33211,37 +33407,67 @@
                 <a:latin typeface="Consolas" pitchFamily="49" charset="0"/>
                 <a:cs typeface="Consolas" pitchFamily="49" charset="0"/>
               </a:rPr>
-              <a:t>   public override void Sort(</a:t>
-            </a:r>
-            <a:r>
-              <a:rPr lang="en-US" sz="2000" dirty="0" err="1">
+              <a:t>   public override void </a:t>
+            </a:r>
+            <a:r>
+              <a:rPr lang="en-US" sz="2000" dirty="0">
                 <a:solidFill>
                   <a:srgbClr val="8CF4F2"/>
                 </a:solidFill>
                 <a:latin typeface="Consolas" pitchFamily="49" charset="0"/>
                 <a:cs typeface="Consolas" pitchFamily="49" charset="0"/>
               </a:rPr>
-              <a:t>ArrayList</a:t>
-            </a:r>
-            <a:r>
-              <a:rPr lang="en-US" sz="2000" dirty="0">
+              <a:t>Sort(</a:t>
+            </a:r>
+            <a:r>
+              <a:rPr lang="en-US" sz="2000" dirty="0" err="1">
                 <a:solidFill>
                   <a:srgbClr val="8CF4F2"/>
                 </a:solidFill>
                 <a:latin typeface="Consolas" pitchFamily="49" charset="0"/>
                 <a:cs typeface="Consolas" pitchFamily="49" charset="0"/>
               </a:rPr>
-              <a:t> list) </a:t>
-            </a:r>
-            <a:r>
-              <a:rPr lang="en-US" sz="2000" dirty="0" smtClean="0">
+              <a:t>IList</a:t>
+            </a:r>
+            <a:r>
+              <a:rPr lang="en-US" sz="2000" dirty="0">
                 <a:solidFill>
                   <a:srgbClr val="8CF4F2"/>
                 </a:solidFill>
                 <a:latin typeface="Consolas" pitchFamily="49" charset="0"/>
                 <a:cs typeface="Consolas" pitchFamily="49" charset="0"/>
               </a:rPr>
-              <a:t>{ /* ... */ }</a:t>
+              <a:t>&lt;object&gt; </a:t>
+            </a:r>
+            <a:r>
+              <a:rPr lang="en-US" sz="2000" dirty="0">
+                <a:solidFill>
+                  <a:srgbClr val="8CF4F2"/>
+                </a:solidFill>
+                <a:latin typeface="Consolas" pitchFamily="49" charset="0"/>
+                <a:cs typeface="Consolas" pitchFamily="49" charset="0"/>
+              </a:rPr>
+              <a:t>list) </a:t>
+            </a:r>
+            <a:r>
+              <a:rPr lang="en-US" sz="2000" dirty="0" smtClean="0">
+                <a:solidFill>
+                  <a:srgbClr val="8CF4F2"/>
+                </a:solidFill>
+                <a:latin typeface="Consolas" pitchFamily="49" charset="0"/>
+                <a:cs typeface="Consolas" pitchFamily="49" charset="0"/>
+              </a:rPr>
+              <a:t>{ </a:t>
+            </a:r>
+            <a:r>
+              <a:rPr lang="en-US" sz="2000" dirty="0" smtClean="0">
+                <a:solidFill>
+                  <a:srgbClr val="8CF4F2"/>
+                </a:solidFill>
+                <a:latin typeface="Consolas" pitchFamily="49" charset="0"/>
+                <a:cs typeface="Consolas" pitchFamily="49" charset="0"/>
+              </a:rPr>
+              <a:t>... }</a:t>
             </a:r>
             <a:endParaRPr lang="en-US" sz="2000" dirty="0">
               <a:solidFill>
@@ -34918,35 +35144,10 @@
                   </a:schemeClr>
                 </a:solidFill>
               </a:rPr>
-              <a:t>Hierarchical visitor</a:t>
-            </a:r>
-          </a:p>
-          <a:p>
-            <a:pPr lvl="1"/>
-            <a:r>
-              <a:rPr lang="en-US" dirty="0" smtClean="0"/>
-              <a:t>Visit </a:t>
-            </a:r>
-            <a:r>
-              <a:rPr lang="en-US" dirty="0"/>
-              <a:t>every node in </a:t>
-            </a:r>
-            <a:r>
-              <a:rPr lang="en-US" dirty="0" smtClean="0"/>
-              <a:t>a hierarchical </a:t>
-            </a:r>
-            <a:r>
-              <a:rPr lang="en-US" dirty="0"/>
-              <a:t>data </a:t>
-            </a:r>
-            <a:r>
-              <a:rPr lang="en-US" dirty="0" smtClean="0"/>
-              <a:t>structure</a:t>
-            </a:r>
-          </a:p>
-          <a:p>
-            <a:r>
-              <a:rPr lang="en-US" dirty="0">
+              <a:t>Hierarchical </a:t>
+            </a:r>
+            <a:r>
+              <a:rPr lang="en-US" dirty="0" smtClean="0">
                 <a:solidFill>
                   <a:schemeClr val="accent5">
                     <a:lumMod val="20000"/>
@@ -34954,7 +35155,49 @@
                   </a:schemeClr>
                 </a:solidFill>
               </a:rPr>
-              <a:t>Protocol stack</a:t>
+              <a:t>visitor </a:t>
+            </a:r>
+            <a:r>
+              <a:rPr lang="en-US" dirty="0">
+                <a:solidFill>
+                  <a:schemeClr val="tx1">
+                    <a:lumMod val="40000"/>
+                    <a:lumOff val="60000"/>
+                  </a:schemeClr>
+                </a:solidFill>
+              </a:rPr>
+              <a:t>(Composite + Visitor)</a:t>
+            </a:r>
+            <a:endParaRPr lang="en-US" dirty="0">
+              <a:solidFill>
+                <a:schemeClr val="tx1">
+                  <a:lumMod val="40000"/>
+                  <a:lumOff val="60000"/>
+                </a:schemeClr>
+              </a:solidFill>
+            </a:endParaRPr>
+          </a:p>
+          <a:p>
+            <a:pPr lvl="1"/>
+            <a:r>
+              <a:rPr lang="en-US" dirty="0" smtClean="0"/>
+              <a:t>Visit </a:t>
+            </a:r>
+            <a:r>
+              <a:rPr lang="en-US" dirty="0"/>
+              <a:t>every node in </a:t>
+            </a:r>
+            <a:r>
+              <a:rPr lang="en-US" dirty="0" smtClean="0"/>
+              <a:t>a hierarchical </a:t>
+            </a:r>
+            <a:r>
+              <a:rPr lang="en-US" dirty="0"/>
+              <a:t>data </a:t>
+            </a:r>
+            <a:r>
+              <a:rPr lang="en-US" dirty="0" smtClean="0"/>
+              <a:t>structure</a:t>
             </a:r>
           </a:p>
           <a:p>
@@ -34967,12 +35210,10 @@
                   </a:schemeClr>
                 </a:solidFill>
               </a:rPr>
-              <a:t>Scheduled-task</a:t>
-            </a:r>
-          </a:p>
-          <a:p>
-            <a:r>
-              <a:rPr lang="en-US" dirty="0">
+              <a:t>Protocol </a:t>
+            </a:r>
+            <a:r>
+              <a:rPr lang="en-US" dirty="0" smtClean="0">
                 <a:solidFill>
                   <a:schemeClr val="accent5">
                     <a:lumMod val="20000"/>
@@ -34980,8 +35221,27 @@
                   </a:schemeClr>
                 </a:solidFill>
               </a:rPr>
-              <a:t>Single-serving visitor</a:t>
-            </a:r>
+              <a:t>stack </a:t>
+            </a:r>
+            <a:r>
+              <a:rPr lang="en-US" dirty="0">
+                <a:solidFill>
+                  <a:schemeClr val="tx1">
+                    <a:lumMod val="40000"/>
+                    <a:lumOff val="60000"/>
+                  </a:schemeClr>
+                </a:solidFill>
+              </a:rPr>
+              <a:t>(Upper Layer / Lower Layer)</a:t>
+            </a:r>
+            <a:endParaRPr lang="en-US" dirty="0">
+              <a:solidFill>
+                <a:schemeClr val="tx1">
+                  <a:lumMod val="40000"/>
+                  <a:lumOff val="60000"/>
+                </a:schemeClr>
+              </a:solidFill>
+            </a:endParaRPr>
           </a:p>
           <a:p>
             <a:r>
@@ -34993,8 +35253,129 @@
                   </a:schemeClr>
                 </a:solidFill>
               </a:rPr>
-              <a:t>Specification pattern</a:t>
-            </a:r>
+              <a:t>Scheduled-task</a:t>
+            </a:r>
+          </a:p>
+          <a:p>
+            <a:r>
+              <a:rPr lang="en-US" dirty="0">
+                <a:solidFill>
+                  <a:schemeClr val="accent5">
+                    <a:lumMod val="20000"/>
+                    <a:lumOff val="80000"/>
+                  </a:schemeClr>
+                </a:solidFill>
+              </a:rPr>
+              <a:t>Single-serving </a:t>
+            </a:r>
+            <a:r>
+              <a:rPr lang="en-US" dirty="0" smtClean="0">
+                <a:solidFill>
+                  <a:schemeClr val="accent5">
+                    <a:lumMod val="20000"/>
+                    <a:lumOff val="80000"/>
+                  </a:schemeClr>
+                </a:solidFill>
+              </a:rPr>
+              <a:t>visitor </a:t>
+            </a:r>
+            <a:r>
+              <a:rPr lang="en-US" dirty="0" smtClean="0">
+                <a:solidFill>
+                  <a:schemeClr val="tx1">
+                    <a:lumMod val="40000"/>
+                    <a:lumOff val="60000"/>
+                  </a:schemeClr>
+                </a:solidFill>
+              </a:rPr>
+              <a:t>(Use </a:t>
+            </a:r>
+            <a:r>
+              <a:rPr lang="en-US" dirty="0">
+                <a:solidFill>
+                  <a:schemeClr val="tx1">
+                    <a:lumMod val="40000"/>
+                    <a:lumOff val="60000"/>
+                  </a:schemeClr>
+                </a:solidFill>
+              </a:rPr>
+              <a:t>and then delete)</a:t>
+            </a:r>
+            <a:endParaRPr lang="en-US" dirty="0">
+              <a:solidFill>
+                <a:schemeClr val="tx1">
+                  <a:lumMod val="40000"/>
+                  <a:lumOff val="60000"/>
+                </a:schemeClr>
+              </a:solidFill>
+            </a:endParaRPr>
+          </a:p>
+          <a:p>
+            <a:r>
+              <a:rPr lang="en-US" dirty="0">
+                <a:solidFill>
+                  <a:schemeClr val="accent5">
+                    <a:lumMod val="20000"/>
+                    <a:lumOff val="80000"/>
+                  </a:schemeClr>
+                </a:solidFill>
+                <a:hlinkClick r:id="rId2"/>
+              </a:rPr>
+              <a:t>Specification </a:t>
+            </a:r>
+            <a:r>
+              <a:rPr lang="en-US" dirty="0" smtClean="0">
+                <a:solidFill>
+                  <a:schemeClr val="accent5">
+                    <a:lumMod val="20000"/>
+                    <a:lumOff val="80000"/>
+                  </a:schemeClr>
+                </a:solidFill>
+                <a:hlinkClick r:id="rId2"/>
+              </a:rPr>
+              <a:t>pattern</a:t>
+            </a:r>
+            <a:r>
+              <a:rPr lang="en-US" dirty="0">
+                <a:solidFill>
+                  <a:schemeClr val="tx1">
+                    <a:lumMod val="40000"/>
+                    <a:lumOff val="60000"/>
+                  </a:schemeClr>
+                </a:solidFill>
+              </a:rPr>
+              <a:t> (</a:t>
+            </a:r>
+            <a:r>
+              <a:rPr lang="en-US" dirty="0">
+                <a:solidFill>
+                  <a:schemeClr val="tx1">
+                    <a:lumMod val="40000"/>
+                    <a:lumOff val="60000"/>
+                  </a:schemeClr>
+                </a:solidFill>
+              </a:rPr>
+              <a:t>C</a:t>
+            </a:r>
+            <a:r>
+              <a:rPr lang="en-US" dirty="0">
+                <a:solidFill>
+                  <a:schemeClr val="tx1">
+                    <a:lumMod val="40000"/>
+                    <a:lumOff val="60000"/>
+                  </a:schemeClr>
+                </a:solidFill>
+              </a:rPr>
+              <a:t>ombine rules (and/or))</a:t>
+            </a:r>
+            <a:endParaRPr lang="en-US" dirty="0">
+              <a:solidFill>
+                <a:schemeClr val="tx1">
+                  <a:lumMod val="40000"/>
+                  <a:lumOff val="60000"/>
+                </a:schemeClr>
+              </a:solidFill>
+            </a:endParaRPr>
           </a:p>
         </p:txBody>
       </p:sp>

</xml_diff>